<commit_message>
Slight changes to presentation
</commit_message>
<xml_diff>
--- a/Presentations/Group 20 Game Pitch 3 - Final Pitch.pptx
+++ b/Presentations/Group 20 Game Pitch 3 - Final Pitch.pptx
@@ -7,12 +7,13 @@
   <p:sldIdLst>
     <p:sldId id="256" r:id="rId2"/>
     <p:sldId id="257" r:id="rId3"/>
-    <p:sldId id="258" r:id="rId4"/>
-    <p:sldId id="260" r:id="rId5"/>
-    <p:sldId id="259" r:id="rId6"/>
-    <p:sldId id="261" r:id="rId7"/>
-    <p:sldId id="262" r:id="rId8"/>
-    <p:sldId id="263" r:id="rId9"/>
+    <p:sldId id="264" r:id="rId4"/>
+    <p:sldId id="258" r:id="rId5"/>
+    <p:sldId id="260" r:id="rId6"/>
+    <p:sldId id="259" r:id="rId7"/>
+    <p:sldId id="261" r:id="rId8"/>
+    <p:sldId id="262" r:id="rId9"/>
+    <p:sldId id="263" r:id="rId10"/>
   </p:sldIdLst>
   <p:sldSz cx="12192000" cy="6858000"/>
   <p:notesSz cx="6858000" cy="9144000"/>
@@ -6165,7 +6166,7 @@
           <a:p>
             <a:r>
               <a:rPr lang="en-GB" dirty="0"/>
-              <a:t>Game Information</a:t>
+              <a:t>Logline</a:t>
             </a:r>
           </a:p>
         </p:txBody>
@@ -6182,7 +6183,7 @@
         </p:nvSpPr>
         <p:spPr>
           <a:xfrm>
-            <a:off x="913795" y="2500200"/>
+            <a:off x="913795" y="1829081"/>
             <a:ext cx="10353762" cy="4058751"/>
           </a:xfrm>
         </p:spPr>
@@ -6191,53 +6192,9 @@
           <a:lstStyle/>
           <a:p>
             <a:r>
-              <a:rPr lang="en-GB" sz="2400" b="1" dirty="0"/>
-              <a:t>Logline</a:t>
-            </a:r>
-            <a:r>
               <a:rPr lang="en-GB" dirty="0"/>
-              <a:t> - Survive waves of interference, through management and skill, to uncover memories of your past.</a:t>
-            </a:r>
-          </a:p>
-          <a:p>
-            <a:endParaRPr lang="en-GB" dirty="0"/>
-          </a:p>
-          <a:p>
-            <a:r>
-              <a:rPr lang="en-GB" sz="2400" b="1" dirty="0"/>
-              <a:t>Demographic</a:t>
-            </a:r>
-            <a:r>
-              <a:rPr lang="en-GB" dirty="0"/>
-              <a:t> – Males (18-24) </a:t>
-            </a:r>
-          </a:p>
-          <a:p>
-            <a:pPr lvl="1"/>
-            <a:r>
-              <a:rPr lang="en-GB" dirty="0"/>
-              <a:t>Increased difficulty to evoke a Learn, Practice, Master loop</a:t>
-            </a:r>
-          </a:p>
-          <a:p>
-            <a:pPr lvl="1"/>
-            <a:r>
-              <a:rPr lang="en-GB" dirty="0"/>
-              <a:t>Hard fun - strategy, obstacles &amp; goals – frustration &amp; fiero</a:t>
-            </a:r>
-          </a:p>
-          <a:p>
-            <a:pPr lvl="1"/>
-            <a:r>
-              <a:rPr lang="en-GB" dirty="0"/>
-              <a:t>Serious fun – rhythm &amp; repetition – zen focus</a:t>
-            </a:r>
-          </a:p>
-          <a:p>
-            <a:pPr marL="450000" lvl="1" indent="0">
-              <a:buNone/>
-            </a:pPr>
-            <a:endParaRPr lang="en-GB" dirty="0"/>
+              <a:t>Survive waves of interference, through management and skill, to uncover memories of your past.</a:t>
+            </a:r>
           </a:p>
           <a:p>
             <a:endParaRPr lang="en-GB" dirty="0"/>
@@ -6290,8 +6247,8 @@
           <a:lstStyle/>
           <a:p>
             <a:r>
-              <a:rPr lang="en-GB" dirty="0"/>
-              <a:t>Obscure Sorrows</a:t>
+              <a:rPr lang="en-US" dirty="0"/>
+              <a:t>Demographic</a:t>
             </a:r>
           </a:p>
         </p:txBody>
@@ -6308,88 +6265,54 @@
         </p:nvSpPr>
         <p:spPr>
           <a:xfrm>
-            <a:off x="913795" y="2491573"/>
+            <a:off x="913795" y="1816339"/>
             <a:ext cx="10353762" cy="4058751"/>
           </a:xfrm>
         </p:spPr>
         <p:txBody>
-          <a:bodyPr>
-            <a:normAutofit/>
-          </a:bodyPr>
-          <a:lstStyle/>
-          <a:p>
-            <a:r>
-              <a:rPr lang="en-GB" sz="2400" b="1" dirty="0" err="1"/>
-              <a:t>Adronitis</a:t>
-            </a:r>
-            <a:r>
-              <a:rPr lang="en-GB" sz="2400" b="1" dirty="0"/>
-              <a:t> </a:t>
-            </a:r>
+          <a:bodyPr/>
+          <a:lstStyle/>
+          <a:p>
             <a:r>
               <a:rPr lang="en-GB" dirty="0"/>
-              <a:t>- </a:t>
-            </a:r>
-            <a:r>
-              <a:rPr lang="en-GB" dirty="0">
-                <a:effectLst/>
-              </a:rPr>
-              <a:t>frustration with how long it takes to get to know someone</a:t>
+              <a:t>Males (18-24) </a:t>
             </a:r>
           </a:p>
           <a:p>
             <a:pPr lvl="1"/>
             <a:r>
               <a:rPr lang="en-GB" dirty="0"/>
-              <a:t>Amnesia causes the player character to not know himself</a:t>
+              <a:t>Increased difficulty to evoke a Learn, Practice, Master loop</a:t>
             </a:r>
           </a:p>
           <a:p>
             <a:pPr lvl="1"/>
+            <a:r>
+              <a:rPr lang="en-GB" dirty="0"/>
+              <a:t>Hard fun - strategy, obstacles &amp; goals – frustration &amp; </a:t>
+            </a:r>
+            <a:r>
+              <a:rPr lang="en-GB" dirty="0" err="1"/>
+              <a:t>fiero</a:t>
+            </a:r>
             <a:endParaRPr lang="en-GB" dirty="0"/>
           </a:p>
           <a:p>
-            <a:r>
-              <a:rPr lang="en-GB" sz="2400" b="1" dirty="0" err="1"/>
-              <a:t>Monachopsis</a:t>
-            </a:r>
+            <a:pPr lvl="1"/>
             <a:r>
               <a:rPr lang="en-GB" dirty="0"/>
-              <a:t> - </a:t>
-            </a:r>
-            <a:r>
-              <a:rPr lang="en-GB" dirty="0">
-                <a:effectLst/>
-              </a:rPr>
-              <a:t>the subtle but persistent feeling of being out of place</a:t>
-            </a:r>
-          </a:p>
-          <a:p>
-            <a:pPr lvl="1"/>
-            <a:r>
-              <a:rPr lang="en-GB" dirty="0"/>
-              <a:t>The player is in a coma, therefore they are feeling out of place</a:t>
-            </a:r>
-            <a:endParaRPr lang="en-GB" b="1" dirty="0"/>
-          </a:p>
-          <a:p>
-            <a:pPr marL="450000" lvl="1" indent="0">
-              <a:buNone/>
-            </a:pPr>
-            <a:endParaRPr lang="en-GB" dirty="0"/>
-          </a:p>
-          <a:p>
-            <a:pPr marL="450000" lvl="1" indent="0">
-              <a:buNone/>
-            </a:pPr>
-            <a:endParaRPr lang="en-GB" dirty="0"/>
+              <a:t>Serious fun – rhythm &amp; repetition – zen focus</a:t>
+            </a:r>
+          </a:p>
+          <a:p>
+            <a:endParaRPr lang="en-US" dirty="0"/>
           </a:p>
         </p:txBody>
       </p:sp>
     </p:spTree>
     <p:extLst>
       <p:ext uri="{BB962C8B-B14F-4D97-AF65-F5344CB8AC3E}">
-        <p14:creationId xmlns:p14="http://schemas.microsoft.com/office/powerpoint/2010/main" val="2996511899"/>
+        <p14:creationId xmlns:p14="http://schemas.microsoft.com/office/powerpoint/2010/main" val="3323964968"/>
       </p:ext>
     </p:extLst>
   </p:cSld>
@@ -6433,6 +6356,148 @@
           <a:p>
             <a:r>
               <a:rPr lang="en-GB" dirty="0"/>
+              <a:t>Obscure Sorrows</a:t>
+            </a:r>
+          </a:p>
+        </p:txBody>
+      </p:sp>
+      <p:sp>
+        <p:nvSpPr>
+          <p:cNvPr id="3" name="Content Placeholder 2"/>
+          <p:cNvSpPr>
+            <a:spLocks noGrp="1"/>
+          </p:cNvSpPr>
+          <p:nvPr>
+            <p:ph idx="1"/>
+          </p:nvPr>
+        </p:nvSpPr>
+        <p:spPr>
+          <a:xfrm>
+            <a:off x="913795" y="2491573"/>
+            <a:ext cx="10353762" cy="4058751"/>
+          </a:xfrm>
+        </p:spPr>
+        <p:txBody>
+          <a:bodyPr>
+            <a:normAutofit/>
+          </a:bodyPr>
+          <a:lstStyle/>
+          <a:p>
+            <a:r>
+              <a:rPr lang="en-GB" sz="2400" b="1" dirty="0" err="1"/>
+              <a:t>Adronitis</a:t>
+            </a:r>
+            <a:r>
+              <a:rPr lang="en-GB" sz="2400" b="1" dirty="0"/>
+              <a:t> </a:t>
+            </a:r>
+            <a:r>
+              <a:rPr lang="en-GB" dirty="0"/>
+              <a:t>- </a:t>
+            </a:r>
+            <a:r>
+              <a:rPr lang="en-GB" dirty="0">
+                <a:effectLst/>
+              </a:rPr>
+              <a:t>frustration with how long it takes to get to know someone</a:t>
+            </a:r>
+          </a:p>
+          <a:p>
+            <a:pPr lvl="1"/>
+            <a:r>
+              <a:rPr lang="en-GB" dirty="0"/>
+              <a:t>Amnesia causes the player character to not know himself</a:t>
+            </a:r>
+          </a:p>
+          <a:p>
+            <a:pPr lvl="1"/>
+            <a:endParaRPr lang="en-GB" dirty="0"/>
+          </a:p>
+          <a:p>
+            <a:r>
+              <a:rPr lang="en-GB" sz="2400" b="1" dirty="0" err="1"/>
+              <a:t>Monachopsis</a:t>
+            </a:r>
+            <a:r>
+              <a:rPr lang="en-GB" dirty="0"/>
+              <a:t> - </a:t>
+            </a:r>
+            <a:r>
+              <a:rPr lang="en-GB" dirty="0">
+                <a:effectLst/>
+              </a:rPr>
+              <a:t>the subtle but persistent feeling of being out of place</a:t>
+            </a:r>
+          </a:p>
+          <a:p>
+            <a:pPr lvl="1"/>
+            <a:r>
+              <a:rPr lang="en-GB" dirty="0"/>
+              <a:t>The player is in a coma, therefore they are feeling out of place</a:t>
+            </a:r>
+            <a:endParaRPr lang="en-GB" b="1" dirty="0"/>
+          </a:p>
+          <a:p>
+            <a:pPr marL="450000" lvl="1" indent="0">
+              <a:buNone/>
+            </a:pPr>
+            <a:endParaRPr lang="en-GB" dirty="0"/>
+          </a:p>
+          <a:p>
+            <a:pPr marL="450000" lvl="1" indent="0">
+              <a:buNone/>
+            </a:pPr>
+            <a:endParaRPr lang="en-GB" dirty="0"/>
+          </a:p>
+        </p:txBody>
+      </p:sp>
+    </p:spTree>
+    <p:extLst>
+      <p:ext uri="{BB962C8B-B14F-4D97-AF65-F5344CB8AC3E}">
+        <p14:creationId xmlns:p14="http://schemas.microsoft.com/office/powerpoint/2010/main" val="2996511899"/>
+      </p:ext>
+    </p:extLst>
+  </p:cSld>
+  <p:clrMapOvr>
+    <a:masterClrMapping/>
+  </p:clrMapOvr>
+</p:sld>
+</file>
+
+<file path=ppt/slides/slide5.xml><?xml version="1.0" encoding="utf-8"?>
+<p:sld xmlns:a="http://schemas.openxmlformats.org/drawingml/2006/main" xmlns:r="http://schemas.openxmlformats.org/officeDocument/2006/relationships" xmlns:p="http://schemas.openxmlformats.org/presentationml/2006/main">
+  <p:cSld>
+    <p:spTree>
+      <p:nvGrpSpPr>
+        <p:cNvPr id="1" name=""/>
+        <p:cNvGrpSpPr/>
+        <p:nvPr/>
+      </p:nvGrpSpPr>
+      <p:grpSpPr>
+        <a:xfrm>
+          <a:off x="0" y="0"/>
+          <a:ext cx="0" cy="0"/>
+          <a:chOff x="0" y="0"/>
+          <a:chExt cx="0" cy="0"/>
+        </a:xfrm>
+      </p:grpSpPr>
+      <p:sp>
+        <p:nvSpPr>
+          <p:cNvPr id="2" name="Title 1"/>
+          <p:cNvSpPr>
+            <a:spLocks noGrp="1"/>
+          </p:cNvSpPr>
+          <p:nvPr>
+            <p:ph type="title"/>
+          </p:nvPr>
+        </p:nvSpPr>
+        <p:spPr/>
+        <p:txBody>
+          <a:bodyPr/>
+          <a:lstStyle/>
+          <a:p>
+            <a:r>
+              <a:rPr lang="en-GB" dirty="0"/>
               <a:t>The Game</a:t>
             </a:r>
           </a:p>
@@ -6481,7 +6546,7 @@
 </p:sld>
 </file>
 
-<file path=ppt/slides/slide5.xml><?xml version="1.0" encoding="utf-8"?>
+<file path=ppt/slides/slide6.xml><?xml version="1.0" encoding="utf-8"?>
 <p:sld xmlns:a="http://schemas.openxmlformats.org/drawingml/2006/main" xmlns:r="http://schemas.openxmlformats.org/officeDocument/2006/relationships" xmlns:p="http://schemas.openxmlformats.org/presentationml/2006/main">
   <p:cSld>
     <p:spTree>
@@ -6682,158 +6747,6 @@
 </p:sld>
 </file>
 
-<file path=ppt/slides/slide6.xml><?xml version="1.0" encoding="utf-8"?>
-<p:sld xmlns:a="http://schemas.openxmlformats.org/drawingml/2006/main" xmlns:r="http://schemas.openxmlformats.org/officeDocument/2006/relationships" xmlns:p="http://schemas.openxmlformats.org/presentationml/2006/main">
-  <p:cSld>
-    <p:spTree>
-      <p:nvGrpSpPr>
-        <p:cNvPr id="1" name=""/>
-        <p:cNvGrpSpPr/>
-        <p:nvPr/>
-      </p:nvGrpSpPr>
-      <p:grpSpPr>
-        <a:xfrm>
-          <a:off x="0" y="0"/>
-          <a:ext cx="0" cy="0"/>
-          <a:chOff x="0" y="0"/>
-          <a:chExt cx="0" cy="0"/>
-        </a:xfrm>
-      </p:grpSpPr>
-      <p:sp>
-        <p:nvSpPr>
-          <p:cNvPr id="2" name="Title 1"/>
-          <p:cNvSpPr>
-            <a:spLocks noGrp="1"/>
-          </p:cNvSpPr>
-          <p:nvPr>
-            <p:ph type="title"/>
-          </p:nvPr>
-        </p:nvSpPr>
-        <p:spPr/>
-        <p:txBody>
-          <a:bodyPr/>
-          <a:lstStyle/>
-          <a:p>
-            <a:r>
-              <a:rPr lang="en-GB" dirty="0"/>
-              <a:t>Things to take forward…</a:t>
-            </a:r>
-          </a:p>
-        </p:txBody>
-      </p:sp>
-      <p:sp>
-        <p:nvSpPr>
-          <p:cNvPr id="3" name="Content Placeholder 2"/>
-          <p:cNvSpPr>
-            <a:spLocks noGrp="1"/>
-          </p:cNvSpPr>
-          <p:nvPr>
-            <p:ph idx="1"/>
-          </p:nvPr>
-        </p:nvSpPr>
-        <p:spPr>
-          <a:xfrm>
-            <a:off x="913795" y="1732449"/>
-            <a:ext cx="10353762" cy="4878076"/>
-          </a:xfrm>
-        </p:spPr>
-        <p:txBody>
-          <a:bodyPr/>
-          <a:lstStyle/>
-          <a:p>
-            <a:r>
-              <a:rPr lang="en-GB" dirty="0"/>
-              <a:t>What we’ve learnt</a:t>
-            </a:r>
-          </a:p>
-          <a:p>
-            <a:endParaRPr lang="en-GB" dirty="0"/>
-          </a:p>
-          <a:p>
-            <a:pPr lvl="1"/>
-            <a:r>
-              <a:rPr lang="en-GB" dirty="0"/>
-              <a:t>Well</a:t>
-            </a:r>
-          </a:p>
-          <a:p>
-            <a:pPr lvl="2"/>
-            <a:r>
-              <a:rPr lang="en-GB" dirty="0"/>
-              <a:t>Communication</a:t>
-            </a:r>
-          </a:p>
-          <a:p>
-            <a:pPr lvl="2"/>
-            <a:r>
-              <a:rPr lang="en-GB" dirty="0"/>
-              <a:t>Meetings</a:t>
-            </a:r>
-          </a:p>
-          <a:p>
-            <a:pPr lvl="2"/>
-            <a:r>
-              <a:rPr lang="en-GB" dirty="0"/>
-              <a:t>Repository Organisation</a:t>
-            </a:r>
-          </a:p>
-          <a:p>
-            <a:pPr lvl="1"/>
-            <a:r>
-              <a:rPr lang="en-GB" dirty="0"/>
-              <a:t>Poorly</a:t>
-            </a:r>
-          </a:p>
-          <a:p>
-            <a:pPr lvl="2"/>
-            <a:r>
-              <a:rPr lang="en-GB" dirty="0"/>
-              <a:t>Scoping</a:t>
-            </a:r>
-          </a:p>
-          <a:p>
-            <a:pPr lvl="2"/>
-            <a:r>
-              <a:rPr lang="en-GB" dirty="0"/>
-              <a:t>Time Management</a:t>
-            </a:r>
-          </a:p>
-          <a:p>
-            <a:pPr lvl="1"/>
-            <a:r>
-              <a:rPr lang="en-GB" dirty="0"/>
-              <a:t>Taking Forward</a:t>
-            </a:r>
-          </a:p>
-          <a:p>
-            <a:pPr lvl="2"/>
-            <a:r>
-              <a:rPr lang="en-GB" dirty="0"/>
-              <a:t>Scoping</a:t>
-            </a:r>
-          </a:p>
-          <a:p>
-            <a:pPr lvl="2"/>
-            <a:r>
-              <a:rPr lang="en-GB" dirty="0"/>
-              <a:t>Group Communication</a:t>
-            </a:r>
-          </a:p>
-        </p:txBody>
-      </p:sp>
-    </p:spTree>
-    <p:extLst>
-      <p:ext uri="{BB962C8B-B14F-4D97-AF65-F5344CB8AC3E}">
-        <p14:creationId xmlns:p14="http://schemas.microsoft.com/office/powerpoint/2010/main" val="2136834931"/>
-      </p:ext>
-    </p:extLst>
-  </p:cSld>
-  <p:clrMapOvr>
-    <a:masterClrMapping/>
-  </p:clrMapOvr>
-</p:sld>
-</file>
-
 <file path=ppt/slides/slide7.xml><?xml version="1.0" encoding="utf-8"?>
 <p:sld xmlns:a="http://schemas.openxmlformats.org/drawingml/2006/main" xmlns:r="http://schemas.openxmlformats.org/officeDocument/2006/relationships" xmlns:p="http://schemas.openxmlformats.org/presentationml/2006/main">
   <p:cSld>
@@ -6868,7 +6781,7 @@
           <a:p>
             <a:r>
               <a:rPr lang="en-GB" dirty="0"/>
-              <a:t>Project Analysis</a:t>
+              <a:t>Things to take forward…</a:t>
             </a:r>
           </a:p>
         </p:txBody>
@@ -6885,8 +6798,160 @@
         </p:nvSpPr>
         <p:spPr>
           <a:xfrm>
-            <a:off x="913795" y="2181023"/>
-            <a:ext cx="3960130" cy="4058751"/>
+            <a:off x="913795" y="1732449"/>
+            <a:ext cx="10353762" cy="4878076"/>
+          </a:xfrm>
+        </p:spPr>
+        <p:txBody>
+          <a:bodyPr/>
+          <a:lstStyle/>
+          <a:p>
+            <a:r>
+              <a:rPr lang="en-GB" dirty="0"/>
+              <a:t>What we’ve learnt</a:t>
+            </a:r>
+          </a:p>
+          <a:p>
+            <a:endParaRPr lang="en-GB" dirty="0"/>
+          </a:p>
+          <a:p>
+            <a:pPr lvl="1"/>
+            <a:r>
+              <a:rPr lang="en-GB" dirty="0"/>
+              <a:t>Well</a:t>
+            </a:r>
+          </a:p>
+          <a:p>
+            <a:pPr lvl="2"/>
+            <a:r>
+              <a:rPr lang="en-GB" dirty="0"/>
+              <a:t>Communication</a:t>
+            </a:r>
+          </a:p>
+          <a:p>
+            <a:pPr lvl="2"/>
+            <a:r>
+              <a:rPr lang="en-GB" dirty="0"/>
+              <a:t>Meetings</a:t>
+            </a:r>
+          </a:p>
+          <a:p>
+            <a:pPr lvl="2"/>
+            <a:r>
+              <a:rPr lang="en-GB" dirty="0"/>
+              <a:t>Repository Organisation</a:t>
+            </a:r>
+          </a:p>
+          <a:p>
+            <a:pPr lvl="1"/>
+            <a:r>
+              <a:rPr lang="en-GB" dirty="0"/>
+              <a:t>Poorly</a:t>
+            </a:r>
+          </a:p>
+          <a:p>
+            <a:pPr lvl="2"/>
+            <a:r>
+              <a:rPr lang="en-GB" dirty="0"/>
+              <a:t>Scoping</a:t>
+            </a:r>
+          </a:p>
+          <a:p>
+            <a:pPr lvl="2"/>
+            <a:r>
+              <a:rPr lang="en-GB" dirty="0"/>
+              <a:t>Time Management</a:t>
+            </a:r>
+          </a:p>
+          <a:p>
+            <a:pPr lvl="1"/>
+            <a:r>
+              <a:rPr lang="en-GB" dirty="0"/>
+              <a:t>Taking Forward</a:t>
+            </a:r>
+          </a:p>
+          <a:p>
+            <a:pPr lvl="2"/>
+            <a:r>
+              <a:rPr lang="en-GB" dirty="0"/>
+              <a:t>Scoping</a:t>
+            </a:r>
+          </a:p>
+          <a:p>
+            <a:pPr lvl="2"/>
+            <a:r>
+              <a:rPr lang="en-GB" dirty="0"/>
+              <a:t>Group Communication</a:t>
+            </a:r>
+          </a:p>
+        </p:txBody>
+      </p:sp>
+    </p:spTree>
+    <p:extLst>
+      <p:ext uri="{BB962C8B-B14F-4D97-AF65-F5344CB8AC3E}">
+        <p14:creationId xmlns:p14="http://schemas.microsoft.com/office/powerpoint/2010/main" val="2136834931"/>
+      </p:ext>
+    </p:extLst>
+  </p:cSld>
+  <p:clrMapOvr>
+    <a:masterClrMapping/>
+  </p:clrMapOvr>
+</p:sld>
+</file>
+
+<file path=ppt/slides/slide8.xml><?xml version="1.0" encoding="utf-8"?>
+<p:sld xmlns:a="http://schemas.openxmlformats.org/drawingml/2006/main" xmlns:r="http://schemas.openxmlformats.org/officeDocument/2006/relationships" xmlns:p="http://schemas.openxmlformats.org/presentationml/2006/main">
+  <p:cSld>
+    <p:spTree>
+      <p:nvGrpSpPr>
+        <p:cNvPr id="1" name=""/>
+        <p:cNvGrpSpPr/>
+        <p:nvPr/>
+      </p:nvGrpSpPr>
+      <p:grpSpPr>
+        <a:xfrm>
+          <a:off x="0" y="0"/>
+          <a:ext cx="0" cy="0"/>
+          <a:chOff x="0" y="0"/>
+          <a:chExt cx="0" cy="0"/>
+        </a:xfrm>
+      </p:grpSpPr>
+      <p:sp>
+        <p:nvSpPr>
+          <p:cNvPr id="2" name="Title 1"/>
+          <p:cNvSpPr>
+            <a:spLocks noGrp="1"/>
+          </p:cNvSpPr>
+          <p:nvPr>
+            <p:ph type="title"/>
+          </p:nvPr>
+        </p:nvSpPr>
+        <p:spPr/>
+        <p:txBody>
+          <a:bodyPr/>
+          <a:lstStyle/>
+          <a:p>
+            <a:r>
+              <a:rPr lang="en-GB" dirty="0"/>
+              <a:t>Project Analysis</a:t>
+            </a:r>
+          </a:p>
+        </p:txBody>
+      </p:sp>
+      <p:sp>
+        <p:nvSpPr>
+          <p:cNvPr id="3" name="Content Placeholder 2"/>
+          <p:cNvSpPr>
+            <a:spLocks noGrp="1"/>
+          </p:cNvSpPr>
+          <p:nvPr>
+            <p:ph idx="1"/>
+          </p:nvPr>
+        </p:nvSpPr>
+        <p:spPr>
+          <a:xfrm>
+            <a:off x="553683" y="2172516"/>
+            <a:ext cx="7802367" cy="4058751"/>
           </a:xfrm>
         </p:spPr>
         <p:txBody>
@@ -6917,7 +6982,7 @@
             </a:r>
             <a:r>
               <a:rPr lang="en-GB" dirty="0"/>
-              <a:t> – 36 hours 10 minutes</a:t>
+              <a:t> – 46 hours 10 minutes (10 hours unrecorded from pre-sprints)</a:t>
             </a:r>
           </a:p>
           <a:p>
@@ -6956,7 +7021,7 @@
             </a:r>
             <a:r>
               <a:rPr lang="en-GB" dirty="0"/>
-              <a:t> – 25 hours 55 minutes</a:t>
+              <a:t> – 35 hours 55 minutes (10 hours unrecorded from pre-sprints)</a:t>
             </a:r>
           </a:p>
           <a:p>
@@ -6969,8 +7034,14 @@
             </a:r>
             <a:r>
               <a:rPr lang="en-GB" dirty="0"/>
-              <a:t> – 24 hours 15 minutes</a:t>
-            </a:r>
+              <a:t> – 34 hours 15 minutes (10 hours unrecorded from pre-sprints)</a:t>
+            </a:r>
+          </a:p>
+          <a:p>
+            <a:pPr marL="36900" indent="0" algn="ctr">
+              <a:buNone/>
+            </a:pPr>
+            <a:endParaRPr lang="en-GB" dirty="0"/>
           </a:p>
         </p:txBody>
       </p:sp>
@@ -6984,7 +7055,7 @@
         </p:nvSpPr>
         <p:spPr>
           <a:xfrm>
-            <a:off x="7307427" y="2181022"/>
+            <a:off x="8146325" y="2172516"/>
             <a:ext cx="3960130" cy="4058751"/>
           </a:xfrm>
           <a:prstGeom prst="rect">
@@ -7445,7 +7516,7 @@
 </p:sld>
 </file>
 
-<file path=ppt/slides/slide8.xml><?xml version="1.0" encoding="utf-8"?>
+<file path=ppt/slides/slide9.xml><?xml version="1.0" encoding="utf-8"?>
 <p:sld xmlns:a="http://schemas.openxmlformats.org/drawingml/2006/main" xmlns:r="http://schemas.openxmlformats.org/officeDocument/2006/relationships" xmlns:p="http://schemas.openxmlformats.org/presentationml/2006/main">
   <p:cSld>
     <p:spTree>

</xml_diff>